<commit_message>
add clustering and anomaly detection
</commit_message>
<xml_diff>
--- a/CourseAdmin/E5072Weekend_v3.pptx
+++ b/CourseAdmin/E5072Weekend_v3.pptx
@@ -218,7 +218,7 @@
           <a:p>
             <a:fld id="{0A3CE07D-E24D-1946-829B-94070D81B3C6}" type="datetimeFigureOut">
               <a:rPr lang="en-US" smtClean="0"/>
-              <a:t>11/9/17</a:t>
+              <a:t>11/19/17</a:t>
             </a:fld>
             <a:endParaRPr lang="en-US"/>
           </a:p>
@@ -1078,7 +1078,7 @@
           <a:p>
             <a:fld id="{4BDF68E2-58F2-4D09-BE8B-E3BD06533059}" type="datetimeFigureOut">
               <a:rPr lang="en-US" smtClean="0"/>
-              <a:t>11/9/17</a:t>
+              <a:t>11/19/17</a:t>
             </a:fld>
             <a:endParaRPr lang="en-US" dirty="0"/>
           </a:p>
@@ -1258,7 +1258,7 @@
           <a:p>
             <a:fld id="{2E2D6473-DF6D-4702-B328-E0DD40540A4E}" type="datetimeFigureOut">
               <a:rPr lang="en-US" smtClean="0"/>
-              <a:t>11/9/17</a:t>
+              <a:t>11/19/17</a:t>
             </a:fld>
             <a:endParaRPr lang="en-US" dirty="0"/>
           </a:p>
@@ -1434,7 +1434,7 @@
           <a:p>
             <a:fld id="{E26F7E3A-B166-407D-9866-32884E7D5B37}" type="datetimeFigureOut">
               <a:rPr lang="en-US" smtClean="0"/>
-              <a:t>11/9/17</a:t>
+              <a:t>11/19/17</a:t>
             </a:fld>
             <a:endParaRPr lang="en-US" dirty="0"/>
           </a:p>
@@ -1626,7 +1626,7 @@
           <a:p>
             <a:fld id="{528FC5F6-F338-4AE4-BB23-26385BCFC423}" type="datetimeFigureOut">
               <a:rPr lang="en-US" smtClean="0"/>
-              <a:t>11/9/17</a:t>
+              <a:t>11/19/17</a:t>
             </a:fld>
             <a:endParaRPr lang="en-US" dirty="0"/>
           </a:p>
@@ -1943,7 +1943,7 @@
           <a:p>
             <a:fld id="{20EBB0C4-6273-4C6E-B9BD-2EDC30F1CD52}" type="datetimeFigureOut">
               <a:rPr lang="en-US" smtClean="0"/>
-              <a:t>11/9/17</a:t>
+              <a:t>11/19/17</a:t>
             </a:fld>
             <a:endParaRPr lang="en-US" dirty="0"/>
           </a:p>
@@ -2404,7 +2404,7 @@
           <a:p>
             <a:fld id="{19AB4D41-86C1-4908-B66A-0B50CEB3BF29}" type="datetimeFigureOut">
               <a:rPr lang="en-US" smtClean="0"/>
-              <a:t>11/9/17</a:t>
+              <a:t>11/19/17</a:t>
             </a:fld>
             <a:endParaRPr lang="en-US" dirty="0"/>
           </a:p>
@@ -2811,7 +2811,7 @@
           <a:p>
             <a:fld id="{E6426E2C-56C1-4E0D-A793-0088A7FDD37E}" type="datetimeFigureOut">
               <a:rPr lang="en-US" smtClean="0"/>
-              <a:t>11/9/17</a:t>
+              <a:t>11/19/17</a:t>
             </a:fld>
             <a:endParaRPr lang="en-US" dirty="0"/>
           </a:p>
@@ -2925,7 +2925,7 @@
           <a:p>
             <a:fld id="{C8C39B41-D8B5-4052-B551-9B5525EAA8B6}" type="datetimeFigureOut">
               <a:rPr lang="en-US" smtClean="0"/>
-              <a:t>11/9/17</a:t>
+              <a:t>11/19/17</a:t>
             </a:fld>
             <a:endParaRPr lang="en-US" dirty="0"/>
           </a:p>
@@ -3039,7 +3039,7 @@
           <a:p>
             <a:fld id="{4D94136C-8742-45B2-AF27-D93DF72833A9}" type="datetimeFigureOut">
               <a:rPr lang="en-US" smtClean="0"/>
-              <a:t>11/9/17</a:t>
+              <a:t>11/19/17</a:t>
             </a:fld>
             <a:endParaRPr lang="en-US" dirty="0"/>
           </a:p>
@@ -3399,7 +3399,7 @@
           <a:p>
             <a:fld id="{32ABBEA6-7C60-4B02-AE87-00D78D8422AF}" type="datetimeFigureOut">
               <a:rPr lang="en-US" smtClean="0"/>
-              <a:t>11/9/17</a:t>
+              <a:t>11/19/17</a:t>
             </a:fld>
             <a:endParaRPr lang="en-US" dirty="0"/>
           </a:p>
@@ -3908,7 +3908,7 @@
           <a:p>
             <a:fld id="{C9CAD897-D46E-4AD2-BD9B-49DD3E640873}" type="datetimeFigureOut">
               <a:rPr lang="en-US" smtClean="0"/>
-              <a:t>11/9/17</a:t>
+              <a:t>11/19/17</a:t>
             </a:fld>
             <a:endParaRPr lang="en-US" dirty="0"/>
           </a:p>
@@ -4259,7 +4259,7 @@
           <a:p>
             <a:fld id="{98624D31-43A5-475A-80CF-332C9F6DCF35}" type="datetimeFigureOut">
               <a:rPr lang="en-US" smtClean="0"/>
-              <a:t>11/9/17</a:t>
+              <a:t>11/19/17</a:t>
             </a:fld>
             <a:endParaRPr lang="en-US" dirty="0"/>
           </a:p>
@@ -5623,11 +5623,7 @@
             </a:r>
             <a:r>
               <a:rPr lang="en-US" dirty="0" smtClean="0"/>
-              <a:t> 10 to 15 (max) </a:t>
-            </a:r>
-            <a:r>
-              <a:rPr lang="en-US" dirty="0" smtClean="0"/>
-              <a:t>slides </a:t>
+              <a:t> 10 to 15 (max) slides </a:t>
             </a:r>
             <a:r>
               <a:rPr lang="mr-IN" dirty="0" smtClean="0"/>
@@ -5637,7 +5633,6 @@
               <a:rPr lang="en-US" dirty="0" smtClean="0"/>
               <a:t> see slides below for additional information.</a:t>
             </a:r>
-            <a:endParaRPr lang="en-US" dirty="0" smtClean="0"/>
           </a:p>
           <a:p>
             <a:pPr lvl="1"/>
@@ -5650,11 +5645,7 @@
             <a:pPr lvl="1"/>
             <a:r>
               <a:rPr lang="en-US" dirty="0" smtClean="0"/>
-              <a:t>Describe </a:t>
-            </a:r>
-            <a:r>
-              <a:rPr lang="en-US" dirty="0" smtClean="0"/>
-              <a:t>the data</a:t>
+              <a:t>Describe the data</a:t>
             </a:r>
           </a:p>
           <a:p>
@@ -5668,28 +5659,15 @@
             <a:pPr lvl="1"/>
             <a:r>
               <a:rPr lang="en-US" dirty="0" smtClean="0"/>
-              <a:t>Show your main </a:t>
-            </a:r>
-            <a:r>
-              <a:rPr lang="en-US" dirty="0" smtClean="0"/>
-              <a:t>results</a:t>
+              <a:t>Show your main results</a:t>
             </a:r>
           </a:p>
           <a:p>
             <a:pPr lvl="1"/>
             <a:r>
               <a:rPr lang="en-US" dirty="0" smtClean="0"/>
-              <a:t>Outline challenges</a:t>
-            </a:r>
-            <a:r>
-              <a:rPr lang="en-US" dirty="0" smtClean="0"/>
-              <a:t>, assumptions, limitations under which results hold, other interesting things to </a:t>
-            </a:r>
-            <a:r>
-              <a:rPr lang="en-US" dirty="0" smtClean="0"/>
-              <a:t>pursue</a:t>
-            </a:r>
-            <a:endParaRPr lang="en-US" dirty="0" smtClean="0"/>
+              <a:t>Outline challenges, assumptions, limitations under which results hold, other interesting things to pursue</a:t>
+            </a:r>
           </a:p>
         </p:txBody>
       </p:sp>
@@ -5839,10 +5817,14 @@
             </a:r>
             <a:r>
               <a:rPr lang="en-US" dirty="0"/>
-              <a:t>investment choices based on your </a:t>
-            </a:r>
-            <a:r>
-              <a:rPr lang="en-US" dirty="0" smtClean="0"/>
+              <a:t>investment choices based on </a:t>
+            </a:r>
+            <a:r>
+              <a:rPr lang="en-US"/>
+              <a:t>your </a:t>
+            </a:r>
+            <a:r>
+              <a:rPr lang="en-US" smtClean="0"/>
               <a:t>analysis.</a:t>
             </a:r>
             <a:endParaRPr lang="en-US" dirty="0"/>

</xml_diff>